<commit_message>
Buy and Sell added
</commit_message>
<xml_diff>
--- a/ProposedFlow.pptx
+++ b/ProposedFlow.pptx
@@ -4020,6 +4020,60 @@
           </a:p>
         </p:txBody>
       </p:sp>
+      <p:sp>
+        <p:nvSpPr>
+          <p:cNvPr id="9" name="Rectangle 8">
+            <a:extLst>
+              <a:ext uri="{FF2B5EF4-FFF2-40B4-BE49-F238E27FC236}">
+                <a16:creationId xmlns:a16="http://schemas.microsoft.com/office/drawing/2014/main" id="{FCE876E5-1868-443B-CDF2-6AF3A8D33886}"/>
+              </a:ext>
+            </a:extLst>
+          </p:cNvPr>
+          <p:cNvSpPr/>
+          <p:nvPr/>
+        </p:nvSpPr>
+        <p:spPr>
+          <a:xfrm>
+            <a:off x="386524" y="2660794"/>
+            <a:ext cx="2060841" cy="3650359"/>
+          </a:xfrm>
+          <a:prstGeom prst="rect">
+            <a:avLst/>
+          </a:prstGeom>
+          <a:noFill/>
+        </p:spPr>
+        <p:style>
+          <a:lnRef idx="2">
+            <a:schemeClr val="accent1">
+              <a:shade val="50000"/>
+            </a:schemeClr>
+          </a:lnRef>
+          <a:fillRef idx="1">
+            <a:schemeClr val="accent1"/>
+          </a:fillRef>
+          <a:effectRef idx="0">
+            <a:schemeClr val="accent1"/>
+          </a:effectRef>
+          <a:fontRef idx="minor">
+            <a:schemeClr val="lt1"/>
+          </a:fontRef>
+        </p:style>
+        <p:txBody>
+          <a:bodyPr rtlCol="0" anchor="ctr"/>
+          <a:lstStyle/>
+          <a:p>
+            <a:pPr algn="ctr"/>
+            <a:r>
+              <a:rPr lang="en-US" dirty="0">
+                <a:solidFill>
+                  <a:schemeClr val="tx1"/>
+                </a:solidFill>
+              </a:rPr>
+              <a:t>Should be most updated from current Stock Market</a:t>
+            </a:r>
+          </a:p>
+        </p:txBody>
+      </p:sp>
     </p:spTree>
     <p:extLst>
       <p:ext uri="{BB962C8B-B14F-4D97-AF65-F5344CB8AC3E}">
@@ -4479,6 +4533,60 @@
           </a:p>
         </p:txBody>
       </p:sp>
+      <p:sp>
+        <p:nvSpPr>
+          <p:cNvPr id="10" name="Rectangle 9">
+            <a:extLst>
+              <a:ext uri="{FF2B5EF4-FFF2-40B4-BE49-F238E27FC236}">
+                <a16:creationId xmlns:a16="http://schemas.microsoft.com/office/drawing/2014/main" id="{85DF8109-4B0E-0E54-DB26-473594D1560C}"/>
+              </a:ext>
+            </a:extLst>
+          </p:cNvPr>
+          <p:cNvSpPr/>
+          <p:nvPr/>
+        </p:nvSpPr>
+        <p:spPr>
+          <a:xfrm>
+            <a:off x="386524" y="2660794"/>
+            <a:ext cx="2060841" cy="3650359"/>
+          </a:xfrm>
+          <a:prstGeom prst="rect">
+            <a:avLst/>
+          </a:prstGeom>
+          <a:noFill/>
+        </p:spPr>
+        <p:style>
+          <a:lnRef idx="2">
+            <a:schemeClr val="accent1">
+              <a:shade val="50000"/>
+            </a:schemeClr>
+          </a:lnRef>
+          <a:fillRef idx="1">
+            <a:schemeClr val="accent1"/>
+          </a:fillRef>
+          <a:effectRef idx="0">
+            <a:schemeClr val="accent1"/>
+          </a:effectRef>
+          <a:fontRef idx="minor">
+            <a:schemeClr val="lt1"/>
+          </a:fontRef>
+        </p:style>
+        <p:txBody>
+          <a:bodyPr rtlCol="0" anchor="ctr"/>
+          <a:lstStyle/>
+          <a:p>
+            <a:pPr algn="ctr"/>
+            <a:r>
+              <a:rPr lang="en-US" dirty="0">
+                <a:solidFill>
+                  <a:schemeClr val="tx1"/>
+                </a:solidFill>
+              </a:rPr>
+              <a:t>Maybe try to make this into composite</a:t>
+            </a:r>
+          </a:p>
+        </p:txBody>
+      </p:sp>
     </p:spTree>
     <p:extLst>
       <p:ext uri="{BB962C8B-B14F-4D97-AF65-F5344CB8AC3E}">
@@ -7127,6 +7235,60 @@
           </a:p>
         </p:txBody>
       </p:sp>
+      <p:sp>
+        <p:nvSpPr>
+          <p:cNvPr id="14" name="Rectangle 13">
+            <a:extLst>
+              <a:ext uri="{FF2B5EF4-FFF2-40B4-BE49-F238E27FC236}">
+                <a16:creationId xmlns:a16="http://schemas.microsoft.com/office/drawing/2014/main" id="{D2ADBC1F-640D-601D-2AC7-3D85B7ABE431}"/>
+              </a:ext>
+            </a:extLst>
+          </p:cNvPr>
+          <p:cNvSpPr/>
+          <p:nvPr/>
+        </p:nvSpPr>
+        <p:spPr>
+          <a:xfrm>
+            <a:off x="386524" y="2660794"/>
+            <a:ext cx="2060841" cy="3650359"/>
+          </a:xfrm>
+          <a:prstGeom prst="rect">
+            <a:avLst/>
+          </a:prstGeom>
+          <a:noFill/>
+        </p:spPr>
+        <p:style>
+          <a:lnRef idx="2">
+            <a:schemeClr val="accent1">
+              <a:shade val="50000"/>
+            </a:schemeClr>
+          </a:lnRef>
+          <a:fillRef idx="1">
+            <a:schemeClr val="accent1"/>
+          </a:fillRef>
+          <a:effectRef idx="0">
+            <a:schemeClr val="accent1"/>
+          </a:effectRef>
+          <a:fontRef idx="minor">
+            <a:schemeClr val="lt1"/>
+          </a:fontRef>
+        </p:style>
+        <p:txBody>
+          <a:bodyPr rtlCol="0" anchor="ctr"/>
+          <a:lstStyle/>
+          <a:p>
+            <a:pPr algn="ctr"/>
+            <a:r>
+              <a:rPr lang="en-US" dirty="0">
+                <a:solidFill>
+                  <a:schemeClr val="tx1"/>
+                </a:solidFill>
+              </a:rPr>
+              <a:t>This should create a user and place into pending array. Factory?</a:t>
+            </a:r>
+          </a:p>
+        </p:txBody>
+      </p:sp>
     </p:spTree>
     <p:extLst>
       <p:ext uri="{BB962C8B-B14F-4D97-AF65-F5344CB8AC3E}">
@@ -9341,6 +9503,60 @@
           </a:p>
         </p:txBody>
       </p:sp>
+      <p:sp>
+        <p:nvSpPr>
+          <p:cNvPr id="4" name="Rectangle 3">
+            <a:extLst>
+              <a:ext uri="{FF2B5EF4-FFF2-40B4-BE49-F238E27FC236}">
+                <a16:creationId xmlns:a16="http://schemas.microsoft.com/office/drawing/2014/main" id="{BAB65C5D-C643-03D4-4368-F8B851910073}"/>
+              </a:ext>
+            </a:extLst>
+          </p:cNvPr>
+          <p:cNvSpPr/>
+          <p:nvPr/>
+        </p:nvSpPr>
+        <p:spPr>
+          <a:xfrm>
+            <a:off x="386524" y="2660794"/>
+            <a:ext cx="2060841" cy="3650359"/>
+          </a:xfrm>
+          <a:prstGeom prst="rect">
+            <a:avLst/>
+          </a:prstGeom>
+          <a:noFill/>
+        </p:spPr>
+        <p:style>
+          <a:lnRef idx="2">
+            <a:schemeClr val="accent1">
+              <a:shade val="50000"/>
+            </a:schemeClr>
+          </a:lnRef>
+          <a:fillRef idx="1">
+            <a:schemeClr val="accent1"/>
+          </a:fillRef>
+          <a:effectRef idx="0">
+            <a:schemeClr val="accent1"/>
+          </a:effectRef>
+          <a:fontRef idx="minor">
+            <a:schemeClr val="lt1"/>
+          </a:fontRef>
+        </p:style>
+        <p:txBody>
+          <a:bodyPr rtlCol="0" anchor="ctr"/>
+          <a:lstStyle/>
+          <a:p>
+            <a:pPr algn="ctr"/>
+            <a:r>
+              <a:rPr lang="en-US" dirty="0">
+                <a:solidFill>
+                  <a:schemeClr val="tx1"/>
+                </a:solidFill>
+              </a:rPr>
+              <a:t>OK button should go back to login page</a:t>
+            </a:r>
+          </a:p>
+        </p:txBody>
+      </p:sp>
     </p:spTree>
     <p:extLst>
       <p:ext uri="{BB962C8B-B14F-4D97-AF65-F5344CB8AC3E}">
@@ -9554,7 +9770,10 @@
           </a:p>
           <a:p>
             <a:pPr algn="ctr"/>
-            <a:endParaRPr lang="en-US" dirty="0"/>
+            <a:r>
+              <a:rPr lang="en-US" dirty="0"/>
+              <a:t>Do as either manager or user</a:t>
+            </a:r>
           </a:p>
         </p:txBody>
       </p:sp>
@@ -9768,6 +9987,60 @@
             <a:r>
               <a:rPr lang="en-US" dirty="0"/>
               <a:t>Forgot Password</a:t>
+            </a:r>
+          </a:p>
+        </p:txBody>
+      </p:sp>
+      <p:sp>
+        <p:nvSpPr>
+          <p:cNvPr id="11" name="Rectangle 10">
+            <a:extLst>
+              <a:ext uri="{FF2B5EF4-FFF2-40B4-BE49-F238E27FC236}">
+                <a16:creationId xmlns:a16="http://schemas.microsoft.com/office/drawing/2014/main" id="{63B67EB6-40D6-97A8-E99D-B61159FBDF51}"/>
+              </a:ext>
+            </a:extLst>
+          </p:cNvPr>
+          <p:cNvSpPr/>
+          <p:nvPr/>
+        </p:nvSpPr>
+        <p:spPr>
+          <a:xfrm>
+            <a:off x="386524" y="2660794"/>
+            <a:ext cx="2060841" cy="3650359"/>
+          </a:xfrm>
+          <a:prstGeom prst="rect">
+            <a:avLst/>
+          </a:prstGeom>
+          <a:noFill/>
+        </p:spPr>
+        <p:style>
+          <a:lnRef idx="2">
+            <a:schemeClr val="accent1">
+              <a:shade val="50000"/>
+            </a:schemeClr>
+          </a:lnRef>
+          <a:fillRef idx="1">
+            <a:schemeClr val="accent1"/>
+          </a:fillRef>
+          <a:effectRef idx="0">
+            <a:schemeClr val="accent1"/>
+          </a:effectRef>
+          <a:fontRef idx="minor">
+            <a:schemeClr val="lt1"/>
+          </a:fontRef>
+        </p:style>
+        <p:txBody>
+          <a:bodyPr rtlCol="0" anchor="ctr"/>
+          <a:lstStyle/>
+          <a:p>
+            <a:pPr algn="ctr"/>
+            <a:r>
+              <a:rPr lang="en-US" dirty="0">
+                <a:solidFill>
+                  <a:schemeClr val="tx1"/>
+                </a:solidFill>
+              </a:rPr>
+              <a:t>See Ryans idea about different login portals</a:t>
             </a:r>
           </a:p>
         </p:txBody>
@@ -10074,6 +10347,60 @@
           </a:p>
         </p:txBody>
       </p:sp>
+      <p:sp>
+        <p:nvSpPr>
+          <p:cNvPr id="8" name="Rectangle 7">
+            <a:extLst>
+              <a:ext uri="{FF2B5EF4-FFF2-40B4-BE49-F238E27FC236}">
+                <a16:creationId xmlns:a16="http://schemas.microsoft.com/office/drawing/2014/main" id="{25826371-D664-7266-899B-EB665955070B}"/>
+              </a:ext>
+            </a:extLst>
+          </p:cNvPr>
+          <p:cNvSpPr/>
+          <p:nvPr/>
+        </p:nvSpPr>
+        <p:spPr>
+          <a:xfrm>
+            <a:off x="386524" y="2660794"/>
+            <a:ext cx="2060841" cy="3650359"/>
+          </a:xfrm>
+          <a:prstGeom prst="rect">
+            <a:avLst/>
+          </a:prstGeom>
+          <a:noFill/>
+        </p:spPr>
+        <p:style>
+          <a:lnRef idx="2">
+            <a:schemeClr val="accent1">
+              <a:shade val="50000"/>
+            </a:schemeClr>
+          </a:lnRef>
+          <a:fillRef idx="1">
+            <a:schemeClr val="accent1"/>
+          </a:fillRef>
+          <a:effectRef idx="0">
+            <a:schemeClr val="accent1"/>
+          </a:effectRef>
+          <a:fontRef idx="minor">
+            <a:schemeClr val="lt1"/>
+          </a:fontRef>
+        </p:style>
+        <p:txBody>
+          <a:bodyPr rtlCol="0" anchor="ctr"/>
+          <a:lstStyle/>
+          <a:p>
+            <a:pPr algn="ctr"/>
+            <a:r>
+              <a:rPr lang="en-US" dirty="0">
+                <a:solidFill>
+                  <a:schemeClr val="tx1"/>
+                </a:solidFill>
+              </a:rPr>
+              <a:t>Must include ¾ to recover</a:t>
+            </a:r>
+          </a:p>
+        </p:txBody>
+      </p:sp>
     </p:spTree>
     <p:extLst>
       <p:ext uri="{BB962C8B-B14F-4D97-AF65-F5344CB8AC3E}">
@@ -10220,6 +10547,60 @@
           </a:p>
         </p:txBody>
       </p:sp>
+      <p:sp>
+        <p:nvSpPr>
+          <p:cNvPr id="4" name="Rectangle 3">
+            <a:extLst>
+              <a:ext uri="{FF2B5EF4-FFF2-40B4-BE49-F238E27FC236}">
+                <a16:creationId xmlns:a16="http://schemas.microsoft.com/office/drawing/2014/main" id="{4537B100-90FD-A501-52B7-11A8E2689980}"/>
+              </a:ext>
+            </a:extLst>
+          </p:cNvPr>
+          <p:cNvSpPr/>
+          <p:nvPr/>
+        </p:nvSpPr>
+        <p:spPr>
+          <a:xfrm>
+            <a:off x="386524" y="2660794"/>
+            <a:ext cx="2060841" cy="3650359"/>
+          </a:xfrm>
+          <a:prstGeom prst="rect">
+            <a:avLst/>
+          </a:prstGeom>
+          <a:noFill/>
+        </p:spPr>
+        <p:style>
+          <a:lnRef idx="2">
+            <a:schemeClr val="accent1">
+              <a:shade val="50000"/>
+            </a:schemeClr>
+          </a:lnRef>
+          <a:fillRef idx="1">
+            <a:schemeClr val="accent1"/>
+          </a:fillRef>
+          <a:effectRef idx="0">
+            <a:schemeClr val="accent1"/>
+          </a:effectRef>
+          <a:fontRef idx="minor">
+            <a:schemeClr val="lt1"/>
+          </a:fontRef>
+        </p:style>
+        <p:txBody>
+          <a:bodyPr rtlCol="0" anchor="ctr"/>
+          <a:lstStyle/>
+          <a:p>
+            <a:pPr algn="ctr"/>
+            <a:r>
+              <a:rPr lang="en-US" dirty="0">
+                <a:solidFill>
+                  <a:schemeClr val="tx1"/>
+                </a:solidFill>
+              </a:rPr>
+              <a:t>Or error if not enough data/ wrong data</a:t>
+            </a:r>
+          </a:p>
+        </p:txBody>
+      </p:sp>
     </p:spTree>
     <p:extLst>
       <p:ext uri="{BB962C8B-B14F-4D97-AF65-F5344CB8AC3E}">
@@ -10614,6 +10995,60 @@
           </a:p>
         </p:txBody>
       </p:sp>
+      <p:sp>
+        <p:nvSpPr>
+          <p:cNvPr id="9" name="Rectangle 8">
+            <a:extLst>
+              <a:ext uri="{FF2B5EF4-FFF2-40B4-BE49-F238E27FC236}">
+                <a16:creationId xmlns:a16="http://schemas.microsoft.com/office/drawing/2014/main" id="{583AB43D-DF0F-8487-38D8-FE0E31459FC0}"/>
+              </a:ext>
+            </a:extLst>
+          </p:cNvPr>
+          <p:cNvSpPr/>
+          <p:nvPr/>
+        </p:nvSpPr>
+        <p:spPr>
+          <a:xfrm>
+            <a:off x="386524" y="2660794"/>
+            <a:ext cx="2060841" cy="3650359"/>
+          </a:xfrm>
+          <a:prstGeom prst="rect">
+            <a:avLst/>
+          </a:prstGeom>
+          <a:noFill/>
+        </p:spPr>
+        <p:style>
+          <a:lnRef idx="2">
+            <a:schemeClr val="accent1">
+              <a:shade val="50000"/>
+            </a:schemeClr>
+          </a:lnRef>
+          <a:fillRef idx="1">
+            <a:schemeClr val="accent1"/>
+          </a:fillRef>
+          <a:effectRef idx="0">
+            <a:schemeClr val="accent1"/>
+          </a:effectRef>
+          <a:fontRef idx="minor">
+            <a:schemeClr val="lt1"/>
+          </a:fontRef>
+        </p:style>
+        <p:txBody>
+          <a:bodyPr rtlCol="0" anchor="ctr"/>
+          <a:lstStyle/>
+          <a:p>
+            <a:pPr algn="ctr"/>
+            <a:r>
+              <a:rPr lang="en-US" dirty="0">
+                <a:solidFill>
+                  <a:schemeClr val="tx1"/>
+                </a:solidFill>
+              </a:rPr>
+              <a:t>Selecting a stock will show</a:t>
+            </a:r>
+          </a:p>
+        </p:txBody>
+      </p:sp>
     </p:spTree>
     <p:extLst>
       <p:ext uri="{BB962C8B-B14F-4D97-AF65-F5344CB8AC3E}">
@@ -10856,6 +11291,71 @@
             <a:r>
               <a:rPr lang="en-US" dirty="0"/>
               <a:t>Cancel</a:t>
+            </a:r>
+          </a:p>
+        </p:txBody>
+      </p:sp>
+      <p:sp>
+        <p:nvSpPr>
+          <p:cNvPr id="6" name="Rectangle 5">
+            <a:extLst>
+              <a:ext uri="{FF2B5EF4-FFF2-40B4-BE49-F238E27FC236}">
+                <a16:creationId xmlns:a16="http://schemas.microsoft.com/office/drawing/2014/main" id="{91D0D3EF-F84A-5355-34D1-33176E8421A5}"/>
+              </a:ext>
+            </a:extLst>
+          </p:cNvPr>
+          <p:cNvSpPr/>
+          <p:nvPr/>
+        </p:nvSpPr>
+        <p:spPr>
+          <a:xfrm>
+            <a:off x="386524" y="2660794"/>
+            <a:ext cx="2060841" cy="3650359"/>
+          </a:xfrm>
+          <a:prstGeom prst="rect">
+            <a:avLst/>
+          </a:prstGeom>
+          <a:noFill/>
+        </p:spPr>
+        <p:style>
+          <a:lnRef idx="2">
+            <a:schemeClr val="accent1">
+              <a:shade val="50000"/>
+            </a:schemeClr>
+          </a:lnRef>
+          <a:fillRef idx="1">
+            <a:schemeClr val="accent1"/>
+          </a:fillRef>
+          <a:effectRef idx="0">
+            <a:schemeClr val="accent1"/>
+          </a:effectRef>
+          <a:fontRef idx="minor">
+            <a:schemeClr val="lt1"/>
+          </a:fontRef>
+        </p:style>
+        <p:txBody>
+          <a:bodyPr rtlCol="0" anchor="ctr"/>
+          <a:lstStyle/>
+          <a:p>
+            <a:pPr algn="ctr"/>
+            <a:r>
+              <a:rPr lang="en-US" dirty="0">
+                <a:solidFill>
+                  <a:schemeClr val="tx1"/>
+                </a:solidFill>
+              </a:rPr>
+              <a:t>Updates Home user page</a:t>
+            </a:r>
+          </a:p>
+          <a:p>
+            <a:pPr algn="ctr"/>
+            <a:r>
+              <a:rPr lang="en-US" dirty="0">
+                <a:solidFill>
+                  <a:schemeClr val="tx1"/>
+                </a:solidFill>
+              </a:rPr>
+              <a:t>(Observer)</a:t>
             </a:r>
           </a:p>
         </p:txBody>

</xml_diff>